<commit_message>
220330_2309 .gitignore 설정(DS_Store) / 앱 아이콘 제작
</commit_message>
<xml_diff>
--- a/img/img.pptx
+++ b/img/img.pptx
@@ -104,6 +104,11 @@
       </a:defRPr>
     </a:lvl9pPr>
   </p:defaultTextStyle>
+  <p:extLst>
+    <p:ext uri="{EFAFB233-063F-42B5-8137-9DF3F51BA10A}">
+      <p15:sldGuideLst xmlns:p15="http://schemas.microsoft.com/office/powerpoint/2012/main"/>
+    </p:ext>
+  </p:extLst>
 </p:presentation>
 </file>
 
@@ -254,7 +259,7 @@
           <a:p>
             <a:fld id="{90FADAA5-4C15-433D-8107-5A9F3914AADE}" type="datetimeFigureOut">
               <a:rPr lang="ko-KR" altLang="en-US" smtClean="0"/>
-              <a:t>2021-10-04</a:t>
+              <a:t>2022. 3. 30.</a:t>
             </a:fld>
             <a:endParaRPr lang="ko-KR" altLang="en-US"/>
           </a:p>
@@ -452,7 +457,7 @@
           <a:p>
             <a:fld id="{90FADAA5-4C15-433D-8107-5A9F3914AADE}" type="datetimeFigureOut">
               <a:rPr lang="ko-KR" altLang="en-US" smtClean="0"/>
-              <a:t>2021-10-04</a:t>
+              <a:t>2022. 3. 30.</a:t>
             </a:fld>
             <a:endParaRPr lang="ko-KR" altLang="en-US"/>
           </a:p>
@@ -660,7 +665,7 @@
           <a:p>
             <a:fld id="{90FADAA5-4C15-433D-8107-5A9F3914AADE}" type="datetimeFigureOut">
               <a:rPr lang="ko-KR" altLang="en-US" smtClean="0"/>
-              <a:t>2021-10-04</a:t>
+              <a:t>2022. 3. 30.</a:t>
             </a:fld>
             <a:endParaRPr lang="ko-KR" altLang="en-US"/>
           </a:p>
@@ -858,7 +863,7 @@
           <a:p>
             <a:fld id="{90FADAA5-4C15-433D-8107-5A9F3914AADE}" type="datetimeFigureOut">
               <a:rPr lang="ko-KR" altLang="en-US" smtClean="0"/>
-              <a:t>2021-10-04</a:t>
+              <a:t>2022. 3. 30.</a:t>
             </a:fld>
             <a:endParaRPr lang="ko-KR" altLang="en-US"/>
           </a:p>
@@ -1133,7 +1138,7 @@
           <a:p>
             <a:fld id="{90FADAA5-4C15-433D-8107-5A9F3914AADE}" type="datetimeFigureOut">
               <a:rPr lang="ko-KR" altLang="en-US" smtClean="0"/>
-              <a:t>2021-10-04</a:t>
+              <a:t>2022. 3. 30.</a:t>
             </a:fld>
             <a:endParaRPr lang="ko-KR" altLang="en-US"/>
           </a:p>
@@ -1398,7 +1403,7 @@
           <a:p>
             <a:fld id="{90FADAA5-4C15-433D-8107-5A9F3914AADE}" type="datetimeFigureOut">
               <a:rPr lang="ko-KR" altLang="en-US" smtClean="0"/>
-              <a:t>2021-10-04</a:t>
+              <a:t>2022. 3. 30.</a:t>
             </a:fld>
             <a:endParaRPr lang="ko-KR" altLang="en-US"/>
           </a:p>
@@ -1810,7 +1815,7 @@
           <a:p>
             <a:fld id="{90FADAA5-4C15-433D-8107-5A9F3914AADE}" type="datetimeFigureOut">
               <a:rPr lang="ko-KR" altLang="en-US" smtClean="0"/>
-              <a:t>2021-10-04</a:t>
+              <a:t>2022. 3. 30.</a:t>
             </a:fld>
             <a:endParaRPr lang="ko-KR" altLang="en-US"/>
           </a:p>
@@ -1951,7 +1956,7 @@
           <a:p>
             <a:fld id="{90FADAA5-4C15-433D-8107-5A9F3914AADE}" type="datetimeFigureOut">
               <a:rPr lang="ko-KR" altLang="en-US" smtClean="0"/>
-              <a:t>2021-10-04</a:t>
+              <a:t>2022. 3. 30.</a:t>
             </a:fld>
             <a:endParaRPr lang="ko-KR" altLang="en-US"/>
           </a:p>
@@ -2064,7 +2069,7 @@
           <a:p>
             <a:fld id="{90FADAA5-4C15-433D-8107-5A9F3914AADE}" type="datetimeFigureOut">
               <a:rPr lang="ko-KR" altLang="en-US" smtClean="0"/>
-              <a:t>2021-10-04</a:t>
+              <a:t>2022. 3. 30.</a:t>
             </a:fld>
             <a:endParaRPr lang="ko-KR" altLang="en-US"/>
           </a:p>
@@ -2375,7 +2380,7 @@
           <a:p>
             <a:fld id="{90FADAA5-4C15-433D-8107-5A9F3914AADE}" type="datetimeFigureOut">
               <a:rPr lang="ko-KR" altLang="en-US" smtClean="0"/>
-              <a:t>2021-10-04</a:t>
+              <a:t>2022. 3. 30.</a:t>
             </a:fld>
             <a:endParaRPr lang="ko-KR" altLang="en-US"/>
           </a:p>
@@ -2663,7 +2668,7 @@
           <a:p>
             <a:fld id="{90FADAA5-4C15-433D-8107-5A9F3914AADE}" type="datetimeFigureOut">
               <a:rPr lang="ko-KR" altLang="en-US" smtClean="0"/>
-              <a:t>2021-10-04</a:t>
+              <a:t>2022. 3. 30.</a:t>
             </a:fld>
             <a:endParaRPr lang="ko-KR" altLang="en-US"/>
           </a:p>
@@ -2904,7 +2909,7 @@
           <a:p>
             <a:fld id="{90FADAA5-4C15-433D-8107-5A9F3914AADE}" type="datetimeFigureOut">
               <a:rPr lang="ko-KR" altLang="en-US" smtClean="0"/>
-              <a:t>2021-10-04</a:t>
+              <a:t>2022. 3. 30.</a:t>
             </a:fld>
             <a:endParaRPr lang="ko-KR" altLang="en-US"/>
           </a:p>
@@ -3361,12 +3366,42 @@
           </a:prstGeom>
         </p:spPr>
       </p:pic>
-      <p:sp>
-        <p:nvSpPr>
-          <p:cNvPr id="6" name="제목 1">
-            <a:extLst>
-              <a:ext uri="{FF2B5EF4-FFF2-40B4-BE49-F238E27FC236}">
-                <a16:creationId xmlns:a16="http://schemas.microsoft.com/office/drawing/2014/main" id="{04ABA598-B690-434A-8E71-94704949CC5B}"/>
+      <p:pic>
+        <p:nvPicPr>
+          <p:cNvPr id="5" name="그림 4">
+            <a:extLst>
+              <a:ext uri="{FF2B5EF4-FFF2-40B4-BE49-F238E27FC236}">
+                <a16:creationId xmlns:a16="http://schemas.microsoft.com/office/drawing/2014/main" id="{C31905E3-5205-8243-8E84-2CE7EEE1D51B}"/>
+              </a:ext>
+            </a:extLst>
+          </p:cNvPr>
+          <p:cNvPicPr>
+            <a:picLocks noChangeAspect="1"/>
+          </p:cNvPicPr>
+          <p:nvPr/>
+        </p:nvPicPr>
+        <p:blipFill>
+          <a:blip r:embed="rId2"/>
+          <a:stretch>
+            <a:fillRect/>
+          </a:stretch>
+        </p:blipFill>
+        <p:spPr>
+          <a:xfrm>
+            <a:off x="5548790" y="5210424"/>
+            <a:ext cx="857250" cy="857250"/>
+          </a:xfrm>
+          <a:prstGeom prst="rect">
+            <a:avLst/>
+          </a:prstGeom>
+        </p:spPr>
+      </p:pic>
+      <p:sp>
+        <p:nvSpPr>
+          <p:cNvPr id="7" name="제목 1">
+            <a:extLst>
+              <a:ext uri="{FF2B5EF4-FFF2-40B4-BE49-F238E27FC236}">
+                <a16:creationId xmlns:a16="http://schemas.microsoft.com/office/drawing/2014/main" id="{90C3D8C4-5587-CC49-8FBE-8A71D7CD1B01}"/>
               </a:ext>
             </a:extLst>
           </p:cNvPr>
@@ -3377,7 +3412,7 @@
         </p:nvSpPr>
         <p:spPr>
           <a:xfrm>
-            <a:off x="4460032" y="2502809"/>
+            <a:off x="4602705" y="5349770"/>
             <a:ext cx="2749420" cy="717904"/>
           </a:xfrm>
           <a:prstGeom prst="rect">

</xml_diff>